<commit_message>
added native single FOV naming
</commit_message>
<xml_diff>
--- a/Presentation/Compressing Folder Sets.pptx
+++ b/Presentation/Compressing Folder Sets.pptx
@@ -264,7 +264,7 @@
           <a:p>
             <a:fld id="{5D563C03-BD61-4E96-9012-123098D71FB1}" type="datetimeFigureOut">
               <a:rPr lang="en-US" smtClean="0"/>
-              <a:t>1/24/2025</a:t>
+              <a:t>6/5/2025</a:t>
             </a:fld>
             <a:endParaRPr lang="en-US"/>
           </a:p>
@@ -462,7 +462,7 @@
           <a:p>
             <a:fld id="{5D563C03-BD61-4E96-9012-123098D71FB1}" type="datetimeFigureOut">
               <a:rPr lang="en-US" smtClean="0"/>
-              <a:t>1/24/2025</a:t>
+              <a:t>6/5/2025</a:t>
             </a:fld>
             <a:endParaRPr lang="en-US"/>
           </a:p>
@@ -670,7 +670,7 @@
           <a:p>
             <a:fld id="{5D563C03-BD61-4E96-9012-123098D71FB1}" type="datetimeFigureOut">
               <a:rPr lang="en-US" smtClean="0"/>
-              <a:t>1/24/2025</a:t>
+              <a:t>6/5/2025</a:t>
             </a:fld>
             <a:endParaRPr lang="en-US"/>
           </a:p>
@@ -868,7 +868,7 @@
           <a:p>
             <a:fld id="{5D563C03-BD61-4E96-9012-123098D71FB1}" type="datetimeFigureOut">
               <a:rPr lang="en-US" smtClean="0"/>
-              <a:t>1/24/2025</a:t>
+              <a:t>6/5/2025</a:t>
             </a:fld>
             <a:endParaRPr lang="en-US"/>
           </a:p>
@@ -1143,7 +1143,7 @@
           <a:p>
             <a:fld id="{5D563C03-BD61-4E96-9012-123098D71FB1}" type="datetimeFigureOut">
               <a:rPr lang="en-US" smtClean="0"/>
-              <a:t>1/24/2025</a:t>
+              <a:t>6/5/2025</a:t>
             </a:fld>
             <a:endParaRPr lang="en-US"/>
           </a:p>
@@ -1408,7 +1408,7 @@
           <a:p>
             <a:fld id="{5D563C03-BD61-4E96-9012-123098D71FB1}" type="datetimeFigureOut">
               <a:rPr lang="en-US" smtClean="0"/>
-              <a:t>1/24/2025</a:t>
+              <a:t>6/5/2025</a:t>
             </a:fld>
             <a:endParaRPr lang="en-US"/>
           </a:p>
@@ -1820,7 +1820,7 @@
           <a:p>
             <a:fld id="{5D563C03-BD61-4E96-9012-123098D71FB1}" type="datetimeFigureOut">
               <a:rPr lang="en-US" smtClean="0"/>
-              <a:t>1/24/2025</a:t>
+              <a:t>6/5/2025</a:t>
             </a:fld>
             <a:endParaRPr lang="en-US"/>
           </a:p>
@@ -1961,7 +1961,7 @@
           <a:p>
             <a:fld id="{5D563C03-BD61-4E96-9012-123098D71FB1}" type="datetimeFigureOut">
               <a:rPr lang="en-US" smtClean="0"/>
-              <a:t>1/24/2025</a:t>
+              <a:t>6/5/2025</a:t>
             </a:fld>
             <a:endParaRPr lang="en-US"/>
           </a:p>
@@ -2074,7 +2074,7 @@
           <a:p>
             <a:fld id="{5D563C03-BD61-4E96-9012-123098D71FB1}" type="datetimeFigureOut">
               <a:rPr lang="en-US" smtClean="0"/>
-              <a:t>1/24/2025</a:t>
+              <a:t>6/5/2025</a:t>
             </a:fld>
             <a:endParaRPr lang="en-US"/>
           </a:p>
@@ -2385,7 +2385,7 @@
           <a:p>
             <a:fld id="{5D563C03-BD61-4E96-9012-123098D71FB1}" type="datetimeFigureOut">
               <a:rPr lang="en-US" smtClean="0"/>
-              <a:t>1/24/2025</a:t>
+              <a:t>6/5/2025</a:t>
             </a:fld>
             <a:endParaRPr lang="en-US"/>
           </a:p>
@@ -2673,7 +2673,7 @@
           <a:p>
             <a:fld id="{5D563C03-BD61-4E96-9012-123098D71FB1}" type="datetimeFigureOut">
               <a:rPr lang="en-US" smtClean="0"/>
-              <a:t>1/24/2025</a:t>
+              <a:t>6/5/2025</a:t>
             </a:fld>
             <a:endParaRPr lang="en-US"/>
           </a:p>
@@ -2914,7 +2914,7 @@
           <a:p>
             <a:fld id="{5D563C03-BD61-4E96-9012-123098D71FB1}" type="datetimeFigureOut">
               <a:rPr lang="en-US" smtClean="0"/>
-              <a:t>1/24/2025</a:t>
+              <a:t>6/5/2025</a:t>
             </a:fld>
             <a:endParaRPr lang="en-US"/>
           </a:p>
@@ -3979,8 +3979,94 @@
           <a:p>
             <a:r>
               <a:rPr lang="en-US" dirty="0"/>
-              <a:t>Overall </a:t>
-            </a:r>
+              <a:t>Archiving Folder Sets </a:t>
+            </a:r>
+          </a:p>
+        </p:txBody>
+      </p:sp>
+      <p:sp>
+        <p:nvSpPr>
+          <p:cNvPr id="3" name="TextBox 2">
+            <a:extLst>
+              <a:ext uri="{FF2B5EF4-FFF2-40B4-BE49-F238E27FC236}">
+                <a16:creationId xmlns:a16="http://schemas.microsoft.com/office/drawing/2014/main" id="{9BA743D0-EC66-31F9-928F-74450C8E7514}"/>
+              </a:ext>
+            </a:extLst>
+          </p:cNvPr>
+          <p:cNvSpPr txBox="1"/>
+          <p:nvPr/>
+        </p:nvSpPr>
+        <p:spPr>
+          <a:xfrm>
+            <a:off x="1018903" y="1236617"/>
+            <a:ext cx="10676708" cy="2308324"/>
+          </a:xfrm>
+          <a:prstGeom prst="rect">
+            <a:avLst/>
+          </a:prstGeom>
+          <a:noFill/>
+        </p:spPr>
+        <p:txBody>
+          <a:bodyPr wrap="square" rtlCol="0">
+            <a:spAutoFit/>
+          </a:bodyPr>
+          <a:lstStyle/>
+          <a:p>
+            <a:r>
+              <a:rPr lang="en-US" dirty="0"/>
+              <a:t>Each dataset will contain 2 folders. Here are each folders contents:</a:t>
+            </a:r>
+          </a:p>
+          <a:p>
+            <a:endParaRPr lang="en-US" dirty="0"/>
+          </a:p>
+          <a:p>
+            <a:r>
+              <a:rPr lang="en-US" dirty="0"/>
+              <a:t>Folder 1 (</a:t>
+            </a:r>
+            <a:r>
+              <a:rPr lang="en-US" dirty="0" err="1"/>
+              <a:t>McMicro</a:t>
+            </a:r>
+            <a:r>
+              <a:rPr lang="en-US" dirty="0"/>
+              <a:t>):</a:t>
+            </a:r>
+          </a:p>
+          <a:p>
+            <a:pPr marL="342900" indent="-342900">
+              <a:buFont typeface="+mj-lt"/>
+              <a:buAutoNum type="arabicPeriod"/>
+            </a:pPr>
+            <a:r>
+              <a:rPr lang="en-US" dirty="0"/>
+              <a:t>Stitched final images</a:t>
+            </a:r>
+          </a:p>
+          <a:p>
+            <a:endParaRPr lang="en-US" dirty="0"/>
+          </a:p>
+          <a:p>
+            <a:r>
+              <a:rPr lang="en-US" dirty="0"/>
+              <a:t>Folder 2:</a:t>
+            </a:r>
+          </a:p>
+          <a:p>
+            <a:pPr marL="342900" indent="-342900">
+              <a:buAutoNum type="arabicPeriod"/>
+            </a:pPr>
+            <a:r>
+              <a:rPr lang="en-US" dirty="0"/>
+              <a:t>Single copy of all raw (post HDR) images from every channel and for both stain and bleach</a:t>
+            </a:r>
+          </a:p>
+          <a:p>
+            <a:pPr marL="342900" indent="-342900">
+              <a:buAutoNum type="arabicPeriod"/>
+            </a:pPr>
+            <a:endParaRPr lang="en-US" dirty="0"/>
           </a:p>
         </p:txBody>
       </p:sp>

</xml_diff>